<commit_message>
mainly small proofreading updates
</commit_message>
<xml_diff>
--- a/Python.pptx
+++ b/Python.pptx
@@ -5,21 +5,22 @@
     <p:sldMasterId id="2147483660" r:id="rId4"/>
   </p:sldMasterIdLst>
   <p:notesMasterIdLst>
-    <p:notesMasterId r:id="rId14"/>
+    <p:notesMasterId r:id="rId15"/>
   </p:notesMasterIdLst>
   <p:handoutMasterIdLst>
-    <p:handoutMasterId r:id="rId15"/>
+    <p:handoutMasterId r:id="rId16"/>
   </p:handoutMasterIdLst>
   <p:sldIdLst>
     <p:sldId id="257" r:id="rId5"/>
     <p:sldId id="279" r:id="rId6"/>
-    <p:sldId id="277" r:id="rId7"/>
-    <p:sldId id="271" r:id="rId8"/>
-    <p:sldId id="278" r:id="rId9"/>
-    <p:sldId id="270" r:id="rId10"/>
-    <p:sldId id="273" r:id="rId11"/>
-    <p:sldId id="274" r:id="rId12"/>
-    <p:sldId id="276" r:id="rId13"/>
+    <p:sldId id="280" r:id="rId7"/>
+    <p:sldId id="277" r:id="rId8"/>
+    <p:sldId id="271" r:id="rId9"/>
+    <p:sldId id="278" r:id="rId10"/>
+    <p:sldId id="270" r:id="rId11"/>
+    <p:sldId id="273" r:id="rId12"/>
+    <p:sldId id="274" r:id="rId13"/>
+    <p:sldId id="276" r:id="rId14"/>
   </p:sldIdLst>
   <p:sldSz cx="12192000" cy="6858000"/>
   <p:notesSz cx="6858000" cy="9144000"/>
@@ -902,43 +903,7 @@
 <dgm:dataModel xmlns:dgm="http://schemas.openxmlformats.org/drawingml/2006/diagram" xmlns:a="http://schemas.openxmlformats.org/drawingml/2006/main">
   <dgm:ptLst>
     <dgm:pt modelId="{B6B5A832-5BD2-49D2-A6CB-01997419A6CE}" type="doc">
-      <dgm:prSet loTypeId="urn:microsoft.com/office/officeart/2008/layout/LinedList" loCatId="list" qsTypeId="urn:microsoft.com/office/officeart/2005/8/quickstyle/simple1" qsCatId="simple" csTypeId="urn:microsoft.com/office/officeart/2005/8/colors/accent1_2" csCatId="accent1"/>
-      <dgm:spPr/>
-      <dgm:t>
-        <a:bodyPr/>
-        <a:lstStyle/>
-        <a:p>
-          <a:endParaRPr lang="en-US"/>
-        </a:p>
-      </dgm:t>
-    </dgm:pt>
-    <dgm:pt modelId="{7B04A9F0-8C25-457D-B7E2-E17DC3686477}">
-      <dgm:prSet/>
-      <dgm:spPr/>
-      <dgm:t>
-        <a:bodyPr/>
-        <a:lstStyle/>
-        <a:p>
-          <a:r>
-            <a:rPr lang="en-US"/>
-            <a:t>Introductions</a:t>
-          </a:r>
-        </a:p>
-      </dgm:t>
-    </dgm:pt>
-    <dgm:pt modelId="{6997CB49-F76D-4BC6-B95B-0FE18D033DEA}" type="parTrans" cxnId="{B4671A08-D2BA-4C02-9AD9-3D15A50815D0}">
-      <dgm:prSet/>
-      <dgm:spPr/>
-      <dgm:t>
-        <a:bodyPr/>
-        <a:lstStyle/>
-        <a:p>
-          <a:endParaRPr lang="en-US"/>
-        </a:p>
-      </dgm:t>
-    </dgm:pt>
-    <dgm:pt modelId="{9A3E94BF-48FD-4BE5-9B50-8FACEBC5166B}" type="sibTrans" cxnId="{B4671A08-D2BA-4C02-9AD9-3D15A50815D0}">
-      <dgm:prSet/>
+      <dgm:prSet loTypeId="urn:microsoft.com/office/officeart/2008/layout/LinedList" loCatId="list" qsTypeId="urn:microsoft.com/office/officeart/2005/8/quickstyle/simple1" qsCatId="simple" csTypeId="urn:microsoft.com/office/officeart/2005/8/colors/accent1_2" csCatId="accent1" phldr="1"/>
       <dgm:spPr/>
       <dgm:t>
         <a:bodyPr/>
@@ -956,7 +921,7 @@
         <a:lstStyle/>
         <a:p>
           <a:r>
-            <a:rPr lang="en-US"/>
+            <a:rPr lang="en-US" dirty="0"/>
             <a:t>Why Python</a:t>
           </a:r>
         </a:p>
@@ -992,7 +957,7 @@
         <a:lstStyle/>
         <a:p>
           <a:r>
-            <a:rPr lang="en-US"/>
+            <a:rPr lang="en-US" dirty="0"/>
             <a:t>Install Anaconda</a:t>
           </a:r>
         </a:p>
@@ -1064,7 +1029,7 @@
         <a:lstStyle/>
         <a:p>
           <a:r>
-            <a:rPr lang="en-US"/>
+            <a:rPr lang="en-US" dirty="0"/>
             <a:t>Q&amp;A and support</a:t>
           </a:r>
         </a:p>
@@ -1082,6 +1047,42 @@
       </dgm:t>
     </dgm:pt>
     <dgm:pt modelId="{3F1ABF7B-45BB-4944-AE29-B4B300D8B066}" type="sibTrans" cxnId="{32FEE3B3-97F9-43A5-A966-CEB2735097D4}">
+      <dgm:prSet/>
+      <dgm:spPr/>
+      <dgm:t>
+        <a:bodyPr/>
+        <a:lstStyle/>
+        <a:p>
+          <a:endParaRPr lang="en-US"/>
+        </a:p>
+      </dgm:t>
+    </dgm:pt>
+    <dgm:pt modelId="{7B04A9F0-8C25-457D-B7E2-E17DC3686477}">
+      <dgm:prSet/>
+      <dgm:spPr/>
+      <dgm:t>
+        <a:bodyPr/>
+        <a:lstStyle/>
+        <a:p>
+          <a:r>
+            <a:rPr lang="en-US" dirty="0"/>
+            <a:t>Overview</a:t>
+          </a:r>
+        </a:p>
+      </dgm:t>
+    </dgm:pt>
+    <dgm:pt modelId="{9A3E94BF-48FD-4BE5-9B50-8FACEBC5166B}" type="sibTrans" cxnId="{B4671A08-D2BA-4C02-9AD9-3D15A50815D0}">
+      <dgm:prSet/>
+      <dgm:spPr/>
+      <dgm:t>
+        <a:bodyPr/>
+        <a:lstStyle/>
+        <a:p>
+          <a:endParaRPr lang="en-US"/>
+        </a:p>
+      </dgm:t>
+    </dgm:pt>
+    <dgm:pt modelId="{6997CB49-F76D-4BC6-B95B-0FE18D033DEA}" type="parTrans" cxnId="{B4671A08-D2BA-4C02-9AD9-3D15A50815D0}">
       <dgm:prSet/>
       <dgm:spPr/>
       <dgm:t>
@@ -1334,8 +1335,8 @@
             <a:buNone/>
           </a:pPr>
           <a:r>
-            <a:rPr lang="en-US" sz="3400" kern="1200"/>
-            <a:t>Introductions</a:t>
+            <a:rPr lang="en-US" sz="3400" kern="1200" dirty="0"/>
+            <a:t>Overview</a:t>
           </a:r>
         </a:p>
       </dsp:txBody>
@@ -1444,7 +1445,7 @@
             <a:buNone/>
           </a:pPr>
           <a:r>
-            <a:rPr lang="en-US" sz="3400" kern="1200"/>
+            <a:rPr lang="en-US" sz="3400" kern="1200" dirty="0"/>
             <a:t>Why Python</a:t>
           </a:r>
         </a:p>
@@ -1554,7 +1555,7 @@
             <a:buNone/>
           </a:pPr>
           <a:r>
-            <a:rPr lang="en-US" sz="3400" kern="1200"/>
+            <a:rPr lang="en-US" sz="3400" kern="1200" dirty="0"/>
             <a:t>Install Anaconda</a:t>
           </a:r>
         </a:p>
@@ -1774,7 +1775,7 @@
             <a:buNone/>
           </a:pPr>
           <a:r>
-            <a:rPr lang="en-US" sz="3400" kern="1200"/>
+            <a:rPr lang="en-US" sz="3400" kern="1200" dirty="0"/>
             <a:t>Q&amp;A and support</a:t>
           </a:r>
         </a:p>
@@ -3374,7 +3375,7 @@
           <a:p>
             <a:fld id="{968352EF-F8B4-490E-BDA3-82DC75179E2E}" type="datetimeFigureOut">
               <a:rPr lang="en-US" sz="1050" smtClean="0"/>
-              <a:t>4/29/2021</a:t>
+              <a:t>6/5/2021</a:t>
             </a:fld>
             <a:endParaRPr lang="en-US" sz="1050"/>
           </a:p>
@@ -3548,7 +3549,7 @@
             <a:fld id="{4930BB39-A48A-4F39-82E8-57BBBA24F175}" type="datetimeFigureOut">
               <a:rPr lang="en-US" smtClean="0"/>
               <a:pPr/>
-              <a:t>4/29/2021</a:t>
+              <a:t>6/5/2021</a:t>
             </a:fld>
             <a:endParaRPr lang="en-US"/>
           </a:p>
@@ -28040,7 +28041,7 @@
           <a:p>
             <a:r>
               <a:rPr lang="en-US" dirty="0"/>
-              <a:t>Python bootcamp</a:t>
+              <a:t>Python crash course</a:t>
             </a:r>
           </a:p>
         </p:txBody>
@@ -28130,6 +28131,277 @@
 </p:sld>
 </file>
 
+<file path=ppt/slides/slide10.xml><?xml version="1.0" encoding="utf-8"?>
+<p:sld xmlns:a="http://schemas.openxmlformats.org/drawingml/2006/main" xmlns:r="http://schemas.openxmlformats.org/officeDocument/2006/relationships" xmlns:p="http://schemas.openxmlformats.org/presentationml/2006/main">
+  <p:cSld>
+    <p:spTree>
+      <p:nvGrpSpPr>
+        <p:cNvPr id="1" name=""/>
+        <p:cNvGrpSpPr/>
+        <p:nvPr/>
+      </p:nvGrpSpPr>
+      <p:grpSpPr>
+        <a:xfrm>
+          <a:off x="0" y="0"/>
+          <a:ext cx="0" cy="0"/>
+          <a:chOff x="0" y="0"/>
+          <a:chExt cx="0" cy="0"/>
+        </a:xfrm>
+      </p:grpSpPr>
+      <p:sp>
+        <p:nvSpPr>
+          <p:cNvPr id="2" name="Title 1">
+            <a:extLst>
+              <a:ext uri="{FF2B5EF4-FFF2-40B4-BE49-F238E27FC236}">
+                <a16:creationId xmlns:a16="http://schemas.microsoft.com/office/drawing/2014/main" id="{6BC8556A-5FB3-4B6D-A38E-6DBDA20692B9}"/>
+              </a:ext>
+            </a:extLst>
+          </p:cNvPr>
+          <p:cNvSpPr>
+            <a:spLocks noGrp="1"/>
+          </p:cNvSpPr>
+          <p:nvPr>
+            <p:ph type="title"/>
+          </p:nvPr>
+        </p:nvSpPr>
+        <p:spPr>
+          <a:xfrm>
+            <a:off x="550164" y="365760"/>
+            <a:ext cx="11091672" cy="1231106"/>
+          </a:xfrm>
+        </p:spPr>
+        <p:txBody>
+          <a:bodyPr/>
+          <a:lstStyle/>
+          <a:p>
+            <a:r>
+              <a:rPr lang="en-US" dirty="0"/>
+              <a:t>Ways to continue building your Python and R skills</a:t>
+            </a:r>
+          </a:p>
+        </p:txBody>
+      </p:sp>
+      <p:sp>
+        <p:nvSpPr>
+          <p:cNvPr id="3" name="Slide Number Placeholder 2">
+            <a:extLst>
+              <a:ext uri="{FF2B5EF4-FFF2-40B4-BE49-F238E27FC236}">
+                <a16:creationId xmlns:a16="http://schemas.microsoft.com/office/drawing/2014/main" id="{38214455-0F24-455F-9F79-D516658AC025}"/>
+              </a:ext>
+            </a:extLst>
+          </p:cNvPr>
+          <p:cNvSpPr>
+            <a:spLocks noGrp="1"/>
+          </p:cNvSpPr>
+          <p:nvPr>
+            <p:ph type="sldNum" sz="quarter" idx="4"/>
+          </p:nvPr>
+        </p:nvSpPr>
+        <p:spPr/>
+        <p:txBody>
+          <a:bodyPr/>
+          <a:lstStyle/>
+          <a:p>
+            <a:fld id="{3557A5E0-42A1-4219-A27A-56DCAEF617DA}" type="slidenum">
+              <a:rPr lang="en-US" smtClean="0"/>
+              <a:t>10</a:t>
+            </a:fld>
+            <a:endParaRPr lang="en-US"/>
+          </a:p>
+        </p:txBody>
+      </p:sp>
+      <p:sp>
+        <p:nvSpPr>
+          <p:cNvPr id="4" name="Content Placeholder 3">
+            <a:extLst>
+              <a:ext uri="{FF2B5EF4-FFF2-40B4-BE49-F238E27FC236}">
+                <a16:creationId xmlns:a16="http://schemas.microsoft.com/office/drawing/2014/main" id="{C7A25E5F-B827-4DC5-823D-94DE3C6EC99F}"/>
+              </a:ext>
+            </a:extLst>
+          </p:cNvPr>
+          <p:cNvSpPr>
+            <a:spLocks noGrp="1"/>
+          </p:cNvSpPr>
+          <p:nvPr>
+            <p:ph sz="quarter" idx="14"/>
+          </p:nvPr>
+        </p:nvSpPr>
+        <p:spPr>
+          <a:xfrm>
+            <a:off x="6252755" y="1745215"/>
+            <a:ext cx="5449824" cy="4572000"/>
+          </a:xfrm>
+        </p:spPr>
+        <p:txBody>
+          <a:bodyPr/>
+          <a:lstStyle/>
+          <a:p>
+            <a:pPr marL="285750" indent="-285750">
+              <a:buFont typeface="Arial" panose="020B0604020202020204" pitchFamily="34" charset="0"/>
+              <a:buChar char="•"/>
+            </a:pPr>
+            <a:r>
+              <a:rPr lang="en-US" dirty="0" err="1"/>
+              <a:t>DataCamp</a:t>
+            </a:r>
+            <a:endParaRPr lang="en-US" dirty="0"/>
+          </a:p>
+          <a:p>
+            <a:pPr marL="285750" indent="-285750">
+              <a:buFont typeface="Arial" panose="020B0604020202020204" pitchFamily="34" charset="0"/>
+              <a:buChar char="•"/>
+            </a:pPr>
+            <a:r>
+              <a:rPr lang="en-US" dirty="0" err="1"/>
+              <a:t>DataQuest</a:t>
+            </a:r>
+            <a:endParaRPr lang="en-US" dirty="0"/>
+          </a:p>
+          <a:p>
+            <a:pPr marL="285750" indent="-285750">
+              <a:buFont typeface="Arial" panose="020B0604020202020204" pitchFamily="34" charset="0"/>
+              <a:buChar char="•"/>
+            </a:pPr>
+            <a:r>
+              <a:rPr lang="en-US" dirty="0" err="1"/>
+              <a:t>Hackerrank</a:t>
+            </a:r>
+            <a:endParaRPr lang="en-US" dirty="0"/>
+          </a:p>
+          <a:p>
+            <a:pPr marL="285750" indent="-285750">
+              <a:buFont typeface="Arial" panose="020B0604020202020204" pitchFamily="34" charset="0"/>
+              <a:buChar char="•"/>
+            </a:pPr>
+            <a:r>
+              <a:rPr lang="en-US" dirty="0"/>
+              <a:t>Reading the official Python documentation or documentation for other Python packages</a:t>
+            </a:r>
+          </a:p>
+          <a:p>
+            <a:pPr marL="285750" indent="-285750">
+              <a:buFont typeface="Arial" panose="020B0604020202020204" pitchFamily="34" charset="0"/>
+              <a:buChar char="•"/>
+            </a:pPr>
+            <a:r>
+              <a:rPr lang="en-US" dirty="0"/>
+              <a:t>Kaggle (participating in competitions, looking at what others are doing)</a:t>
+            </a:r>
+          </a:p>
+          <a:p>
+            <a:pPr marL="285750" indent="-285750">
+              <a:buFont typeface="Arial" panose="020B0604020202020204" pitchFamily="34" charset="0"/>
+              <a:buChar char="•"/>
+            </a:pPr>
+            <a:r>
+              <a:rPr lang="en-US" dirty="0"/>
+              <a:t>Codewars.com</a:t>
+            </a:r>
+          </a:p>
+          <a:p>
+            <a:pPr marL="285750" indent="-285750">
+              <a:buFont typeface="Arial" panose="020B0604020202020204" pitchFamily="34" charset="0"/>
+              <a:buChar char="•"/>
+            </a:pPr>
+            <a:r>
+              <a:rPr lang="en-US" dirty="0"/>
+              <a:t>Books (e.g. Clean Code with Python 2</a:t>
+            </a:r>
+            <a:r>
+              <a:rPr lang="en-US" baseline="30000" dirty="0"/>
+              <a:t>nd</a:t>
+            </a:r>
+            <a:r>
+              <a:rPr lang="en-US" dirty="0"/>
+              <a:t> Edition by Mariano Anaya), Minimal Python by Noah Gift and Alfredo </a:t>
+            </a:r>
+            <a:r>
+              <a:rPr lang="en-US" dirty="0" err="1"/>
+              <a:t>Deza</a:t>
+            </a:r>
+            <a:r>
+              <a:rPr lang="en-US" dirty="0"/>
+              <a:t>, Python Data Science Essentials by Alberto </a:t>
+            </a:r>
+            <a:r>
+              <a:rPr lang="en-US" dirty="0" err="1"/>
+              <a:t>Boschetti</a:t>
+            </a:r>
+            <a:r>
+              <a:rPr lang="en-US" dirty="0"/>
+              <a:t>, </a:t>
+            </a:r>
+            <a:r>
+              <a:rPr lang="en-US" dirty="0" err="1"/>
+              <a:t>etc</a:t>
+            </a:r>
+            <a:r>
+              <a:rPr lang="en-US" dirty="0"/>
+              <a:t>)</a:t>
+            </a:r>
+          </a:p>
+        </p:txBody>
+      </p:sp>
+      <p:pic>
+        <p:nvPicPr>
+          <p:cNvPr id="6" name="Picture 2" descr="Python - Wikiversity">
+            <a:extLst>
+              <a:ext uri="{FF2B5EF4-FFF2-40B4-BE49-F238E27FC236}">
+                <a16:creationId xmlns:a16="http://schemas.microsoft.com/office/drawing/2014/main" id="{3B8539A0-A6B4-4F2A-85CF-CDF1A2B7D67B}"/>
+              </a:ext>
+            </a:extLst>
+          </p:cNvPr>
+          <p:cNvPicPr>
+            <a:picLocks noChangeAspect="1" noChangeArrowheads="1"/>
+          </p:cNvPicPr>
+          <p:nvPr/>
+        </p:nvPicPr>
+        <p:blipFill>
+          <a:blip r:embed="rId2">
+            <a:extLst>
+              <a:ext uri="{28A0092B-C50C-407E-A947-70E740481C1C}">
+                <a14:useLocalDpi xmlns:a14="http://schemas.microsoft.com/office/drawing/2010/main" val="0"/>
+              </a:ext>
+            </a:extLst>
+          </a:blip>
+          <a:srcRect/>
+          <a:stretch>
+            <a:fillRect/>
+          </a:stretch>
+        </p:blipFill>
+        <p:spPr bwMode="auto">
+          <a:xfrm>
+            <a:off x="896258" y="1664305"/>
+            <a:ext cx="4443790" cy="4443790"/>
+          </a:xfrm>
+          <a:prstGeom prst="rect">
+            <a:avLst/>
+          </a:prstGeom>
+          <a:noFill/>
+          <a:extLst>
+            <a:ext uri="{909E8E84-426E-40DD-AFC4-6F175D3DCCD1}">
+              <a14:hiddenFill xmlns:a14="http://schemas.microsoft.com/office/drawing/2010/main">
+                <a:solidFill>
+                  <a:srgbClr val="FFFFFF"/>
+                </a:solidFill>
+              </a14:hiddenFill>
+            </a:ext>
+          </a:extLst>
+        </p:spPr>
+      </p:pic>
+    </p:spTree>
+    <p:extLst>
+      <p:ext uri="{BB962C8B-B14F-4D97-AF65-F5344CB8AC3E}">
+        <p14:creationId xmlns:p14="http://schemas.microsoft.com/office/powerpoint/2010/main" val="1807528862"/>
+      </p:ext>
+    </p:extLst>
+  </p:cSld>
+  <p:clrMapOvr>
+    <a:masterClrMapping/>
+  </p:clrMapOvr>
+</p:sld>
+</file>
+
 <file path=ppt/slides/slide2.xml><?xml version="1.0" encoding="utf-8"?>
 <p:sld xmlns:a="http://schemas.openxmlformats.org/drawingml/2006/main" xmlns:r="http://schemas.openxmlformats.org/officeDocument/2006/relationships" xmlns:p="http://schemas.openxmlformats.org/presentationml/2006/main">
   <p:cSld>
@@ -28242,7 +28514,7 @@
             <p:ph sz="quarter" idx="13"/>
             <p:extLst>
               <p:ext uri="{D42A27DB-BD31-4B8C-83A1-F6EECF244321}">
-                <p14:modId xmlns:p14="http://schemas.microsoft.com/office/powerpoint/2010/main" val="2321005986"/>
+                <p14:modId xmlns:p14="http://schemas.microsoft.com/office/powerpoint/2010/main" val="4222719674"/>
               </p:ext>
             </p:extLst>
           </p:nvPr>
@@ -28292,6 +28564,227 @@
           <p:cNvPr id="2" name="Title 1">
             <a:extLst>
               <a:ext uri="{FF2B5EF4-FFF2-40B4-BE49-F238E27FC236}">
+                <a16:creationId xmlns:a16="http://schemas.microsoft.com/office/drawing/2014/main" id="{51694AE3-B28E-4C8A-9858-FBCADCD19CAA}"/>
+              </a:ext>
+            </a:extLst>
+          </p:cNvPr>
+          <p:cNvSpPr>
+            <a:spLocks noGrp="1"/>
+          </p:cNvSpPr>
+          <p:nvPr>
+            <p:ph type="title"/>
+          </p:nvPr>
+        </p:nvSpPr>
+        <p:spPr/>
+        <p:txBody>
+          <a:bodyPr/>
+          <a:lstStyle/>
+          <a:p>
+            <a:r>
+              <a:rPr lang="en-US" dirty="0"/>
+              <a:t>Why Python</a:t>
+            </a:r>
+          </a:p>
+        </p:txBody>
+      </p:sp>
+      <p:sp>
+        <p:nvSpPr>
+          <p:cNvPr id="3" name="Slide Number Placeholder 2">
+            <a:extLst>
+              <a:ext uri="{FF2B5EF4-FFF2-40B4-BE49-F238E27FC236}">
+                <a16:creationId xmlns:a16="http://schemas.microsoft.com/office/drawing/2014/main" id="{A0CD879C-F7A4-4804-947D-3DA88AC00599}"/>
+              </a:ext>
+            </a:extLst>
+          </p:cNvPr>
+          <p:cNvSpPr>
+            <a:spLocks noGrp="1"/>
+          </p:cNvSpPr>
+          <p:nvPr>
+            <p:ph type="sldNum" sz="quarter" idx="4"/>
+          </p:nvPr>
+        </p:nvSpPr>
+        <p:spPr/>
+        <p:txBody>
+          <a:bodyPr/>
+          <a:lstStyle/>
+          <a:p>
+            <a:fld id="{3557A5E0-42A1-4219-A27A-56DCAEF617DA}" type="slidenum">
+              <a:rPr lang="en-US" smtClean="0"/>
+              <a:t>3</a:t>
+            </a:fld>
+            <a:endParaRPr lang="en-US"/>
+          </a:p>
+        </p:txBody>
+      </p:sp>
+      <p:sp>
+        <p:nvSpPr>
+          <p:cNvPr id="4" name="Content Placeholder 3">
+            <a:extLst>
+              <a:ext uri="{FF2B5EF4-FFF2-40B4-BE49-F238E27FC236}">
+                <a16:creationId xmlns:a16="http://schemas.microsoft.com/office/drawing/2014/main" id="{68CCA054-4E19-42E2-B30F-08E35972E1E4}"/>
+              </a:ext>
+            </a:extLst>
+          </p:cNvPr>
+          <p:cNvSpPr>
+            <a:spLocks noGrp="1"/>
+          </p:cNvSpPr>
+          <p:nvPr>
+            <p:ph sz="quarter" idx="14"/>
+          </p:nvPr>
+        </p:nvSpPr>
+        <p:spPr/>
+        <p:txBody>
+          <a:bodyPr/>
+          <a:lstStyle/>
+          <a:p>
+            <a:pPr marL="285750" indent="-285750">
+              <a:buFont typeface="Arial" panose="020B0604020202020204" pitchFamily="34" charset="0"/>
+              <a:buChar char="•"/>
+            </a:pPr>
+            <a:r>
+              <a:rPr lang="en-US" sz="2000" dirty="0"/>
+              <a:t>Python is a top tool for data science</a:t>
+            </a:r>
+          </a:p>
+          <a:p>
+            <a:pPr marL="285750" indent="-285750">
+              <a:buFont typeface="Arial" panose="020B0604020202020204" pitchFamily="34" charset="0"/>
+              <a:buChar char="•"/>
+            </a:pPr>
+            <a:r>
+              <a:rPr lang="en-US" sz="2000" dirty="0"/>
+              <a:t>Many DS jobs require Python skills</a:t>
+            </a:r>
+          </a:p>
+          <a:p>
+            <a:pPr marL="285750" indent="-285750">
+              <a:buFont typeface="Arial" panose="020B0604020202020204" pitchFamily="34" charset="0"/>
+              <a:buChar char="•"/>
+            </a:pPr>
+            <a:r>
+              <a:rPr lang="en-US" sz="2000" dirty="0"/>
+              <a:t>Many DS tools built in Python</a:t>
+            </a:r>
+          </a:p>
+          <a:p>
+            <a:pPr marL="285750" indent="-285750">
+              <a:buFont typeface="Arial" panose="020B0604020202020204" pitchFamily="34" charset="0"/>
+              <a:buChar char="•"/>
+            </a:pPr>
+            <a:r>
+              <a:rPr lang="en-US" sz="2000" dirty="0"/>
+              <a:t>Network effects</a:t>
+            </a:r>
+          </a:p>
+        </p:txBody>
+      </p:sp>
+      <p:sp>
+        <p:nvSpPr>
+          <p:cNvPr id="5" name="Content Placeholder 4">
+            <a:extLst>
+              <a:ext uri="{FF2B5EF4-FFF2-40B4-BE49-F238E27FC236}">
+                <a16:creationId xmlns:a16="http://schemas.microsoft.com/office/drawing/2014/main" id="{BC14A8A7-5B4F-41D5-B520-38EAD3C43789}"/>
+              </a:ext>
+            </a:extLst>
+          </p:cNvPr>
+          <p:cNvSpPr>
+            <a:spLocks noGrp="1"/>
+          </p:cNvSpPr>
+          <p:nvPr>
+            <p:ph sz="quarter" idx="15"/>
+          </p:nvPr>
+        </p:nvSpPr>
+        <p:spPr/>
+        <p:txBody>
+          <a:bodyPr/>
+          <a:lstStyle/>
+          <a:p>
+            <a:endParaRPr lang="en-US"/>
+          </a:p>
+        </p:txBody>
+      </p:sp>
+      <p:pic>
+        <p:nvPicPr>
+          <p:cNvPr id="6" name="Picture 4" descr="python-logo-3.6 – The Development Café">
+            <a:extLst>
+              <a:ext uri="{FF2B5EF4-FFF2-40B4-BE49-F238E27FC236}">
+                <a16:creationId xmlns:a16="http://schemas.microsoft.com/office/drawing/2014/main" id="{A76B7EB7-10E8-43CC-AF08-186ED77692CA}"/>
+              </a:ext>
+            </a:extLst>
+          </p:cNvPr>
+          <p:cNvPicPr>
+            <a:picLocks noChangeAspect="1" noChangeArrowheads="1"/>
+          </p:cNvPicPr>
+          <p:nvPr/>
+        </p:nvPicPr>
+        <p:blipFill>
+          <a:blip r:embed="rId2">
+            <a:extLst>
+              <a:ext uri="{28A0092B-C50C-407E-A947-70E740481C1C}">
+                <a14:useLocalDpi xmlns:a14="http://schemas.microsoft.com/office/drawing/2010/main" val="0"/>
+              </a:ext>
+            </a:extLst>
+          </a:blip>
+          <a:srcRect/>
+          <a:stretch>
+            <a:fillRect/>
+          </a:stretch>
+        </p:blipFill>
+        <p:spPr bwMode="auto">
+          <a:xfrm>
+            <a:off x="5827727" y="1956287"/>
+            <a:ext cx="5766288" cy="3459773"/>
+          </a:xfrm>
+          <a:prstGeom prst="rect">
+            <a:avLst/>
+          </a:prstGeom>
+          <a:noFill/>
+          <a:extLst>
+            <a:ext uri="{909E8E84-426E-40DD-AFC4-6F175D3DCCD1}">
+              <a14:hiddenFill xmlns:a14="http://schemas.microsoft.com/office/drawing/2010/main">
+                <a:solidFill>
+                  <a:srgbClr val="FFFFFF"/>
+                </a:solidFill>
+              </a14:hiddenFill>
+            </a:ext>
+          </a:extLst>
+        </p:spPr>
+      </p:pic>
+    </p:spTree>
+    <p:extLst>
+      <p:ext uri="{BB962C8B-B14F-4D97-AF65-F5344CB8AC3E}">
+        <p14:creationId xmlns:p14="http://schemas.microsoft.com/office/powerpoint/2010/main" val="136253728"/>
+      </p:ext>
+    </p:extLst>
+  </p:cSld>
+  <p:clrMapOvr>
+    <a:masterClrMapping/>
+  </p:clrMapOvr>
+</p:sld>
+</file>
+
+<file path=ppt/slides/slide4.xml><?xml version="1.0" encoding="utf-8"?>
+<p:sld xmlns:a="http://schemas.openxmlformats.org/drawingml/2006/main" xmlns:r="http://schemas.openxmlformats.org/officeDocument/2006/relationships" xmlns:p="http://schemas.openxmlformats.org/presentationml/2006/main">
+  <p:cSld>
+    <p:spTree>
+      <p:nvGrpSpPr>
+        <p:cNvPr id="1" name=""/>
+        <p:cNvGrpSpPr/>
+        <p:nvPr/>
+      </p:nvGrpSpPr>
+      <p:grpSpPr>
+        <a:xfrm>
+          <a:off x="0" y="0"/>
+          <a:ext cx="0" cy="0"/>
+          <a:chOff x="0" y="0"/>
+          <a:chExt cx="0" cy="0"/>
+        </a:xfrm>
+      </p:grpSpPr>
+      <p:sp>
+        <p:nvSpPr>
+          <p:cNvPr id="2" name="Title 1">
+            <a:extLst>
+              <a:ext uri="{FF2B5EF4-FFF2-40B4-BE49-F238E27FC236}">
                 <a16:creationId xmlns:a16="http://schemas.microsoft.com/office/drawing/2014/main" id="{D25691FB-5ED3-4740-85C3-3298752CFB5E}"/>
               </a:ext>
             </a:extLst>
@@ -28310,8 +28803,13 @@
           <a:p>
             <a:r>
               <a:rPr lang="en-US" dirty="0"/>
-              <a:t>Why Python</a:t>
-            </a:r>
+              <a:t>Python </a:t>
+            </a:r>
+            <a:r>
+              <a:rPr lang="en-US" dirty="0" err="1"/>
+              <a:t>Philosiphy</a:t>
+            </a:r>
+            <a:endParaRPr lang="en-US" dirty="0"/>
           </a:p>
         </p:txBody>
       </p:sp>
@@ -28338,7 +28836,7 @@
           <a:p>
             <a:fld id="{3557A5E0-42A1-4219-A27A-56DCAEF617DA}" type="slidenum">
               <a:rPr lang="en-US" smtClean="0"/>
-              <a:t>3</a:t>
+              <a:t>4</a:t>
             </a:fld>
             <a:endParaRPr lang="en-US"/>
           </a:p>
@@ -28567,7 +29065,7 @@
 </p:sld>
 </file>
 
-<file path=ppt/slides/slide4.xml><?xml version="1.0" encoding="utf-8"?>
+<file path=ppt/slides/slide5.xml><?xml version="1.0" encoding="utf-8"?>
 <p:sld xmlns:a="http://schemas.openxmlformats.org/drawingml/2006/main" xmlns:r="http://schemas.openxmlformats.org/officeDocument/2006/relationships" xmlns:p="http://schemas.openxmlformats.org/presentationml/2006/main">
   <p:cSld>
     <p:spTree>
@@ -28635,7 +29133,7 @@
           <a:p>
             <a:fld id="{3557A5E0-42A1-4219-A27A-56DCAEF617DA}" type="slidenum">
               <a:rPr lang="en-US" smtClean="0"/>
-              <a:t>4</a:t>
+              <a:t>5</a:t>
             </a:fld>
             <a:endParaRPr lang="en-US"/>
           </a:p>
@@ -28812,7 +29310,7 @@
 </p:sld>
 </file>
 
-<file path=ppt/slides/slide5.xml><?xml version="1.0" encoding="utf-8"?>
+<file path=ppt/slides/slide6.xml><?xml version="1.0" encoding="utf-8"?>
 <p:sld xmlns:a="http://schemas.openxmlformats.org/drawingml/2006/main" xmlns:r="http://schemas.openxmlformats.org/officeDocument/2006/relationships" xmlns:p="http://schemas.openxmlformats.org/presentationml/2006/main">
   <p:cSld>
     <p:spTree>
@@ -28880,7 +29378,7 @@
           <a:p>
             <a:fld id="{3557A5E0-42A1-4219-A27A-56DCAEF617DA}" type="slidenum">
               <a:rPr lang="en-US" smtClean="0"/>
-              <a:t>5</a:t>
+              <a:t>6</a:t>
             </a:fld>
             <a:endParaRPr lang="en-US"/>
           </a:p>
@@ -29183,7 +29681,7 @@
 </p:sld>
 </file>
 
-<file path=ppt/slides/slide6.xml><?xml version="1.0" encoding="utf-8"?>
+<file path=ppt/slides/slide7.xml><?xml version="1.0" encoding="utf-8"?>
 <p:sld xmlns:a="http://schemas.openxmlformats.org/drawingml/2006/main" xmlns:r="http://schemas.openxmlformats.org/officeDocument/2006/relationships" xmlns:p="http://schemas.openxmlformats.org/presentationml/2006/main">
   <p:cSld>
     <p:spTree>
@@ -29251,7 +29749,7 @@
           <a:p>
             <a:fld id="{3557A5E0-42A1-4219-A27A-56DCAEF617DA}" type="slidenum">
               <a:rPr lang="en-US" smtClean="0"/>
-              <a:t>6</a:t>
+              <a:t>7</a:t>
             </a:fld>
             <a:endParaRPr lang="en-US"/>
           </a:p>
@@ -29567,271 +30065,6 @@
     <p:extLst>
       <p:ext uri="{BB962C8B-B14F-4D97-AF65-F5344CB8AC3E}">
         <p14:creationId xmlns:p14="http://schemas.microsoft.com/office/powerpoint/2010/main" val="3637921610"/>
-      </p:ext>
-    </p:extLst>
-  </p:cSld>
-  <p:clrMapOvr>
-    <a:masterClrMapping/>
-  </p:clrMapOvr>
-</p:sld>
-</file>
-
-<file path=ppt/slides/slide7.xml><?xml version="1.0" encoding="utf-8"?>
-<p:sld xmlns:a="http://schemas.openxmlformats.org/drawingml/2006/main" xmlns:r="http://schemas.openxmlformats.org/officeDocument/2006/relationships" xmlns:p="http://schemas.openxmlformats.org/presentationml/2006/main">
-  <p:cSld>
-    <p:spTree>
-      <p:nvGrpSpPr>
-        <p:cNvPr id="1" name=""/>
-        <p:cNvGrpSpPr/>
-        <p:nvPr/>
-      </p:nvGrpSpPr>
-      <p:grpSpPr>
-        <a:xfrm>
-          <a:off x="0" y="0"/>
-          <a:ext cx="0" cy="0"/>
-          <a:chOff x="0" y="0"/>
-          <a:chExt cx="0" cy="0"/>
-        </a:xfrm>
-      </p:grpSpPr>
-      <p:sp>
-        <p:nvSpPr>
-          <p:cNvPr id="2" name="Title 1">
-            <a:extLst>
-              <a:ext uri="{FF2B5EF4-FFF2-40B4-BE49-F238E27FC236}">
-                <a16:creationId xmlns:a16="http://schemas.microsoft.com/office/drawing/2014/main" id="{30CEB580-8FE7-4BEC-8C85-F7857F2B8215}"/>
-              </a:ext>
-            </a:extLst>
-          </p:cNvPr>
-          <p:cNvSpPr>
-            <a:spLocks noGrp="1"/>
-          </p:cNvSpPr>
-          <p:nvPr>
-            <p:ph type="title"/>
-          </p:nvPr>
-        </p:nvSpPr>
-        <p:spPr>
-          <a:xfrm>
-            <a:off x="550164" y="365760"/>
-            <a:ext cx="5004694" cy="615553"/>
-          </a:xfrm>
-        </p:spPr>
-        <p:txBody>
-          <a:bodyPr/>
-          <a:lstStyle/>
-          <a:p>
-            <a:r>
-              <a:rPr lang="en-US" dirty="0"/>
-              <a:t>Docs and books</a:t>
-            </a:r>
-          </a:p>
-        </p:txBody>
-      </p:sp>
-      <p:sp>
-        <p:nvSpPr>
-          <p:cNvPr id="3" name="Slide Number Placeholder 2">
-            <a:extLst>
-              <a:ext uri="{FF2B5EF4-FFF2-40B4-BE49-F238E27FC236}">
-                <a16:creationId xmlns:a16="http://schemas.microsoft.com/office/drawing/2014/main" id="{49FFF6AB-AD37-4438-9007-D0A622A74DCD}"/>
-              </a:ext>
-            </a:extLst>
-          </p:cNvPr>
-          <p:cNvSpPr>
-            <a:spLocks noGrp="1"/>
-          </p:cNvSpPr>
-          <p:nvPr>
-            <p:ph type="sldNum" sz="quarter" idx="4"/>
-          </p:nvPr>
-        </p:nvSpPr>
-        <p:spPr/>
-        <p:txBody>
-          <a:bodyPr/>
-          <a:lstStyle/>
-          <a:p>
-            <a:fld id="{3557A5E0-42A1-4219-A27A-56DCAEF617DA}" type="slidenum">
-              <a:rPr lang="en-US" smtClean="0"/>
-              <a:t>7</a:t>
-            </a:fld>
-            <a:endParaRPr lang="en-US"/>
-          </a:p>
-        </p:txBody>
-      </p:sp>
-      <p:sp>
-        <p:nvSpPr>
-          <p:cNvPr id="4" name="Content Placeholder 3">
-            <a:extLst>
-              <a:ext uri="{FF2B5EF4-FFF2-40B4-BE49-F238E27FC236}">
-                <a16:creationId xmlns:a16="http://schemas.microsoft.com/office/drawing/2014/main" id="{A8E4D9B5-E48D-458D-895E-209C29A1F170}"/>
-              </a:ext>
-            </a:extLst>
-          </p:cNvPr>
-          <p:cNvSpPr>
-            <a:spLocks noGrp="1"/>
-          </p:cNvSpPr>
-          <p:nvPr>
-            <p:ph sz="quarter" idx="14"/>
-          </p:nvPr>
-        </p:nvSpPr>
-        <p:spPr/>
-        <p:txBody>
-          <a:bodyPr/>
-          <a:lstStyle/>
-          <a:p>
-            <a:r>
-              <a:rPr lang="en-US" dirty="0"/>
-              <a:t>Using a search engine and </a:t>
-            </a:r>
-            <a:r>
-              <a:rPr lang="en-US" dirty="0" err="1"/>
-              <a:t>stackoverflow</a:t>
-            </a:r>
-            <a:r>
-              <a:rPr lang="en-US" dirty="0"/>
-              <a:t> is part of writing code and doing data science!</a:t>
-            </a:r>
-          </a:p>
-          <a:p>
-            <a:r>
-              <a:rPr lang="en-US" dirty="0"/>
-              <a:t>Books (e.g. through the library and O’Reilly Safari) are a good way to understand fundamentals of statistics, machine learning, and specialized topics.</a:t>
-            </a:r>
-          </a:p>
-          <a:p>
-            <a:r>
-              <a:rPr lang="en-US" dirty="0">
-                <a:hlinkClick r:id="rId2"/>
-              </a:rPr>
-              <a:t>ISLR</a:t>
-            </a:r>
-            <a:r>
-              <a:rPr lang="en-US" dirty="0"/>
-              <a:t> (stats in R)</a:t>
-            </a:r>
-          </a:p>
-          <a:p>
-            <a:r>
-              <a:rPr lang="en-US" dirty="0">
-                <a:hlinkClick r:id="rId3"/>
-              </a:rPr>
-              <a:t>ESL</a:t>
-            </a:r>
-            <a:r>
-              <a:rPr lang="en-US" dirty="0"/>
-              <a:t> (stats methods and math)</a:t>
-            </a:r>
-          </a:p>
-          <a:p>
-            <a:r>
-              <a:rPr lang="en-US" dirty="0">
-                <a:hlinkClick r:id="rId4"/>
-              </a:rPr>
-              <a:t>Python Machine Learning - Third Edition</a:t>
-            </a:r>
-            <a:r>
-              <a:rPr lang="en-US" dirty="0"/>
-              <a:t> (</a:t>
-            </a:r>
-            <a:r>
-              <a:rPr lang="en-US" dirty="0" err="1"/>
-              <a:t>Packt</a:t>
-            </a:r>
-            <a:r>
-              <a:rPr lang="en-US" dirty="0"/>
-              <a:t>)</a:t>
-            </a:r>
-          </a:p>
-          <a:p>
-            <a:r>
-              <a:rPr lang="en-US" dirty="0">
-                <a:hlinkClick r:id="rId5"/>
-              </a:rPr>
-              <a:t>Clean code in Python – Second Edition</a:t>
-            </a:r>
-            <a:r>
-              <a:rPr lang="en-US" dirty="0"/>
-              <a:t> (</a:t>
-            </a:r>
-            <a:r>
-              <a:rPr lang="en-US" dirty="0" err="1"/>
-              <a:t>Packt</a:t>
-            </a:r>
-            <a:r>
-              <a:rPr lang="en-US" dirty="0"/>
-              <a:t>)</a:t>
-            </a:r>
-          </a:p>
-          <a:p>
-            <a:r>
-              <a:rPr lang="en-US" dirty="0">
-                <a:hlinkClick r:id="rId6"/>
-              </a:rPr>
-              <a:t>R for Data Science</a:t>
-            </a:r>
-            <a:endParaRPr lang="en-US" dirty="0"/>
-          </a:p>
-          <a:p>
-            <a:endParaRPr lang="en-US" dirty="0"/>
-          </a:p>
-        </p:txBody>
-      </p:sp>
-      <p:sp>
-        <p:nvSpPr>
-          <p:cNvPr id="5" name="Content Placeholder 4">
-            <a:extLst>
-              <a:ext uri="{FF2B5EF4-FFF2-40B4-BE49-F238E27FC236}">
-                <a16:creationId xmlns:a16="http://schemas.microsoft.com/office/drawing/2014/main" id="{73C6390C-275C-4918-B1EC-EC199C798EAC}"/>
-              </a:ext>
-            </a:extLst>
-          </p:cNvPr>
-          <p:cNvSpPr>
-            <a:spLocks noGrp="1"/>
-          </p:cNvSpPr>
-          <p:nvPr>
-            <p:ph sz="quarter" idx="15"/>
-          </p:nvPr>
-        </p:nvSpPr>
-        <p:spPr/>
-        <p:txBody>
-          <a:bodyPr/>
-          <a:lstStyle/>
-          <a:p>
-            <a:endParaRPr lang="en-US"/>
-          </a:p>
-        </p:txBody>
-      </p:sp>
-      <p:pic>
-        <p:nvPicPr>
-          <p:cNvPr id="6" name="Picture 5">
-            <a:extLst>
-              <a:ext uri="{FF2B5EF4-FFF2-40B4-BE49-F238E27FC236}">
-                <a16:creationId xmlns:a16="http://schemas.microsoft.com/office/drawing/2014/main" id="{01C4B4B0-B4BF-4955-BCB7-EE9B6557BEA2}"/>
-              </a:ext>
-            </a:extLst>
-          </p:cNvPr>
-          <p:cNvPicPr>
-            <a:picLocks noChangeAspect="1"/>
-          </p:cNvPicPr>
-          <p:nvPr/>
-        </p:nvPicPr>
-        <p:blipFill>
-          <a:blip r:embed="rId7"/>
-          <a:stretch>
-            <a:fillRect/>
-          </a:stretch>
-        </p:blipFill>
-        <p:spPr>
-          <a:xfrm>
-            <a:off x="6247031" y="2476"/>
-            <a:ext cx="4280717" cy="6799291"/>
-          </a:xfrm>
-          <a:prstGeom prst="rect">
-            <a:avLst/>
-          </a:prstGeom>
-        </p:spPr>
-      </p:pic>
-    </p:spTree>
-    <p:extLst>
-      <p:ext uri="{BB962C8B-B14F-4D97-AF65-F5344CB8AC3E}">
-        <p14:creationId xmlns:p14="http://schemas.microsoft.com/office/powerpoint/2010/main" val="447115284"/>
       </p:ext>
     </p:extLst>
   </p:cSld>
@@ -29863,7 +30096,7 @@
           <p:cNvPr id="2" name="Title 1">
             <a:extLst>
               <a:ext uri="{FF2B5EF4-FFF2-40B4-BE49-F238E27FC236}">
-                <a16:creationId xmlns:a16="http://schemas.microsoft.com/office/drawing/2014/main" id="{545B8F2D-6F4F-46B3-A458-36176E1B213F}"/>
+                <a16:creationId xmlns:a16="http://schemas.microsoft.com/office/drawing/2014/main" id="{30CEB580-8FE7-4BEC-8C85-F7857F2B8215}"/>
               </a:ext>
             </a:extLst>
           </p:cNvPr>
@@ -29874,14 +30107,19 @@
             <p:ph type="title"/>
           </p:nvPr>
         </p:nvSpPr>
-        <p:spPr/>
+        <p:spPr>
+          <a:xfrm>
+            <a:off x="550164" y="365760"/>
+            <a:ext cx="5004694" cy="615553"/>
+          </a:xfrm>
+        </p:spPr>
         <p:txBody>
           <a:bodyPr/>
           <a:lstStyle/>
           <a:p>
             <a:r>
               <a:rPr lang="en-US" dirty="0"/>
-              <a:t>Extra Resources for Learning Python</a:t>
+              <a:t>Docs and books</a:t>
             </a:r>
           </a:p>
         </p:txBody>
@@ -29891,7 +30129,7 @@
           <p:cNvPr id="3" name="Slide Number Placeholder 2">
             <a:extLst>
               <a:ext uri="{FF2B5EF4-FFF2-40B4-BE49-F238E27FC236}">
-                <a16:creationId xmlns:a16="http://schemas.microsoft.com/office/drawing/2014/main" id="{4D10F399-EE4A-4982-895E-605F52BDA6CC}"/>
+                <a16:creationId xmlns:a16="http://schemas.microsoft.com/office/drawing/2014/main" id="{49FFF6AB-AD37-4438-9007-D0A622A74DCD}"/>
               </a:ext>
             </a:extLst>
           </p:cNvPr>
@@ -29920,7 +30158,7 @@
           <p:cNvPr id="4" name="Content Placeholder 3">
             <a:extLst>
               <a:ext uri="{FF2B5EF4-FFF2-40B4-BE49-F238E27FC236}">
-                <a16:creationId xmlns:a16="http://schemas.microsoft.com/office/drawing/2014/main" id="{90C94545-585F-4B4D-82C3-0F5B579410E4}"/>
+                <a16:creationId xmlns:a16="http://schemas.microsoft.com/office/drawing/2014/main" id="{A8E4D9B5-E48D-458D-895E-209C29A1F170}"/>
               </a:ext>
             </a:extLst>
           </p:cNvPr>
@@ -29931,76 +30169,102 @@
             <p:ph sz="quarter" idx="14"/>
           </p:nvPr>
         </p:nvSpPr>
-        <p:spPr>
-          <a:xfrm>
-            <a:off x="504678" y="2343150"/>
-            <a:ext cx="5449824" cy="2562958"/>
-          </a:xfrm>
-        </p:spPr>
+        <p:spPr/>
         <p:txBody>
           <a:bodyPr/>
           <a:lstStyle/>
           <a:p>
             <a:r>
               <a:rPr lang="en-US" dirty="0"/>
-              <a:t>If you are still learning Python or feeling shaky on the basics (even after doing the readings), consider doing the following:</a:t>
-            </a:r>
-          </a:p>
-          <a:p>
-            <a:r>
-              <a:rPr lang="en-US" dirty="0"/>
-              <a:t>Complete most of the </a:t>
-            </a:r>
+              <a:t>Using a search engine and </a:t>
+            </a:r>
+            <a:r>
+              <a:rPr lang="en-US" dirty="0" err="1"/>
+              <a:t>stackoverflow</a:t>
+            </a:r>
+            <a:r>
+              <a:rPr lang="en-US" dirty="0"/>
+              <a:t> is part of writing code and doing data science!</a:t>
+            </a:r>
+          </a:p>
+          <a:p>
+            <a:r>
+              <a:rPr lang="en-US" dirty="0"/>
+              <a:t>Books (e.g. through the library and O’Reilly Safari) are a good way to understand fundamentals of statistics, machine learning, and specialized topics.</a:t>
+            </a:r>
+          </a:p>
+          <a:p>
             <a:r>
               <a:rPr lang="en-US" dirty="0">
                 <a:hlinkClick r:id="rId2"/>
               </a:rPr>
-              <a:t>Udacity Intro to Python Course</a:t>
-            </a:r>
-            <a:r>
-              <a:rPr lang="en-US" dirty="0"/>
-              <a:t>.</a:t>
-            </a:r>
-          </a:p>
-          <a:p>
-            <a:pPr marL="285750" indent="-285750">
-              <a:buFont typeface="Arial" panose="020B0604020202020204" pitchFamily="34" charset="0"/>
-              <a:buChar char="•"/>
-            </a:pPr>
-            <a:r>
-              <a:rPr lang="en-US" dirty="0"/>
-              <a:t>Weeks 1 and 2: Lessons 1 and 2</a:t>
-            </a:r>
-          </a:p>
-          <a:p>
-            <a:pPr marL="285750" indent="-285750">
-              <a:buFont typeface="Arial" panose="020B0604020202020204" pitchFamily="34" charset="0"/>
-              <a:buChar char="•"/>
-            </a:pPr>
-            <a:r>
-              <a:rPr lang="en-US" dirty="0"/>
-              <a:t>Week 3 and 4: Lesson 3</a:t>
-            </a:r>
-          </a:p>
-          <a:p>
-            <a:pPr marL="285750" indent="-285750">
-              <a:buFont typeface="Arial" panose="020B0604020202020204" pitchFamily="34" charset="0"/>
-              <a:buChar char="•"/>
-            </a:pPr>
-            <a:r>
-              <a:rPr lang="en-US" dirty="0"/>
-              <a:t>Week 5 and 6: Lesson 4</a:t>
-            </a:r>
-          </a:p>
-          <a:p>
-            <a:pPr marL="285750" indent="-285750">
-              <a:buFont typeface="Arial" panose="020B0604020202020204" pitchFamily="34" charset="0"/>
-              <a:buChar char="•"/>
-            </a:pPr>
-            <a:r>
-              <a:rPr lang="en-US" dirty="0"/>
-              <a:t>Week 7 and 8: Lesson 5</a:t>
-            </a:r>
+              <a:t>ISLR</a:t>
+            </a:r>
+            <a:r>
+              <a:rPr lang="en-US" dirty="0"/>
+              <a:t> (stats in R)</a:t>
+            </a:r>
+          </a:p>
+          <a:p>
+            <a:r>
+              <a:rPr lang="en-US" dirty="0">
+                <a:hlinkClick r:id="rId3"/>
+              </a:rPr>
+              <a:t>ESL</a:t>
+            </a:r>
+            <a:r>
+              <a:rPr lang="en-US" dirty="0"/>
+              <a:t> (stats methods and math)</a:t>
+            </a:r>
+          </a:p>
+          <a:p>
+            <a:r>
+              <a:rPr lang="en-US" dirty="0">
+                <a:hlinkClick r:id="rId4"/>
+              </a:rPr>
+              <a:t>Python Machine Learning - Third Edition</a:t>
+            </a:r>
+            <a:r>
+              <a:rPr lang="en-US" dirty="0"/>
+              <a:t> (</a:t>
+            </a:r>
+            <a:r>
+              <a:rPr lang="en-US" dirty="0" err="1"/>
+              <a:t>Packt</a:t>
+            </a:r>
+            <a:r>
+              <a:rPr lang="en-US" dirty="0"/>
+              <a:t>)</a:t>
+            </a:r>
+          </a:p>
+          <a:p>
+            <a:r>
+              <a:rPr lang="en-US" dirty="0">
+                <a:hlinkClick r:id="rId5"/>
+              </a:rPr>
+              <a:t>Clean code in Python – Second Edition</a:t>
+            </a:r>
+            <a:r>
+              <a:rPr lang="en-US" dirty="0"/>
+              <a:t> (</a:t>
+            </a:r>
+            <a:r>
+              <a:rPr lang="en-US" dirty="0" err="1"/>
+              <a:t>Packt</a:t>
+            </a:r>
+            <a:r>
+              <a:rPr lang="en-US" dirty="0"/>
+              <a:t>)</a:t>
+            </a:r>
+          </a:p>
+          <a:p>
+            <a:r>
+              <a:rPr lang="en-US" dirty="0">
+                <a:hlinkClick r:id="rId6"/>
+              </a:rPr>
+              <a:t>R for Data Science</a:t>
+            </a:r>
+            <a:endParaRPr lang="en-US" dirty="0"/>
           </a:p>
           <a:p>
             <a:endParaRPr lang="en-US" dirty="0"/>
@@ -30012,7 +30276,7 @@
           <p:cNvPr id="5" name="Content Placeholder 4">
             <a:extLst>
               <a:ext uri="{FF2B5EF4-FFF2-40B4-BE49-F238E27FC236}">
-                <a16:creationId xmlns:a16="http://schemas.microsoft.com/office/drawing/2014/main" id="{251434B5-D9AF-4C06-A62A-24B2E66F4170}"/>
+                <a16:creationId xmlns:a16="http://schemas.microsoft.com/office/drawing/2014/main" id="{73C6390C-275C-4918-B1EC-EC199C798EAC}"/>
               </a:ext>
             </a:extLst>
           </p:cNvPr>
@@ -30023,88 +30287,49 @@
             <p:ph sz="quarter" idx="15"/>
           </p:nvPr>
         </p:nvSpPr>
-        <p:spPr>
-          <a:xfrm>
-            <a:off x="6344359" y="2360734"/>
-            <a:ext cx="5449824" cy="2681653"/>
-          </a:xfrm>
-        </p:spPr>
+        <p:spPr/>
         <p:txBody>
           <a:bodyPr/>
           <a:lstStyle/>
           <a:p>
-            <a:r>
-              <a:rPr lang="en-US" dirty="0"/>
-              <a:t>If you are feeling relatively comfortable with Python, you might consider doing the Kaggle course on Python if you need a refresher: </a:t>
-            </a:r>
-            <a:r>
-              <a:rPr lang="en-US" dirty="0">
-                <a:hlinkClick r:id="rId3"/>
-              </a:rPr>
-              <a:t>https://www.kaggle.com/learn/python</a:t>
-            </a:r>
-            <a:endParaRPr lang="en-US" dirty="0"/>
-          </a:p>
-          <a:p>
-            <a:endParaRPr lang="en-US" dirty="0"/>
-          </a:p>
-          <a:p>
-            <a:r>
-              <a:rPr lang="en-US" dirty="0"/>
-              <a:t>There are many other Python learning resources for all levels listed here: </a:t>
-            </a:r>
-            <a:r>
-              <a:rPr lang="en-US" dirty="0">
-                <a:hlinkClick r:id="rId4"/>
-              </a:rPr>
-              <a:t>https://forums.fast.ai/t/recommended-python-learning-resources/26888</a:t>
-            </a:r>
-            <a:endParaRPr lang="en-US" dirty="0"/>
-          </a:p>
-          <a:p>
-            <a:endParaRPr lang="en-US" dirty="0"/>
-          </a:p>
-        </p:txBody>
-      </p:sp>
-      <p:sp>
-        <p:nvSpPr>
-          <p:cNvPr id="8" name="TextBox 7">
+            <a:endParaRPr lang="en-US"/>
+          </a:p>
+        </p:txBody>
+      </p:sp>
+      <p:pic>
+        <p:nvPicPr>
+          <p:cNvPr id="6" name="Picture 5">
             <a:extLst>
               <a:ext uri="{FF2B5EF4-FFF2-40B4-BE49-F238E27FC236}">
-                <a16:creationId xmlns:a16="http://schemas.microsoft.com/office/drawing/2014/main" id="{D76A893C-FF9D-455A-81F9-7C481B641A0A}"/>
+                <a16:creationId xmlns:a16="http://schemas.microsoft.com/office/drawing/2014/main" id="{01C4B4B0-B4BF-4955-BCB7-EE9B6557BEA2}"/>
               </a:ext>
             </a:extLst>
           </p:cNvPr>
-          <p:cNvSpPr txBox="1"/>
+          <p:cNvPicPr>
+            <a:picLocks noChangeAspect="1"/>
+          </p:cNvPicPr>
           <p:nvPr/>
-        </p:nvSpPr>
-        <p:spPr>
-          <a:xfrm>
-            <a:off x="2545290" y="1228579"/>
-            <a:ext cx="7176106" cy="646331"/>
+        </p:nvPicPr>
+        <p:blipFill>
+          <a:blip r:embed="rId7"/>
+          <a:stretch>
+            <a:fillRect/>
+          </a:stretch>
+        </p:blipFill>
+        <p:spPr>
+          <a:xfrm>
+            <a:off x="6247031" y="2476"/>
+            <a:ext cx="4280717" cy="6799291"/>
           </a:xfrm>
           <a:prstGeom prst="rect">
             <a:avLst/>
           </a:prstGeom>
-          <a:noFill/>
-        </p:spPr>
-        <p:txBody>
-          <a:bodyPr wrap="square" rtlCol="0">
-            <a:spAutoFit/>
-          </a:bodyPr>
-          <a:lstStyle/>
-          <a:p>
-            <a:r>
-              <a:rPr lang="en-US" dirty="0"/>
-              <a:t>Python is a foundational skill for much of modern data science. It is worth putting in some time to build solid Python skills.</a:t>
-            </a:r>
-          </a:p>
-        </p:txBody>
-      </p:sp>
+        </p:spPr>
+      </p:pic>
     </p:spTree>
     <p:extLst>
       <p:ext uri="{BB962C8B-B14F-4D97-AF65-F5344CB8AC3E}">
-        <p14:creationId xmlns:p14="http://schemas.microsoft.com/office/powerpoint/2010/main" val="3718481214"/>
+        <p14:creationId xmlns:p14="http://schemas.microsoft.com/office/powerpoint/2010/main" val="447115284"/>
       </p:ext>
     </p:extLst>
   </p:cSld>
@@ -30136,7 +30361,7 @@
           <p:cNvPr id="2" name="Title 1">
             <a:extLst>
               <a:ext uri="{FF2B5EF4-FFF2-40B4-BE49-F238E27FC236}">
-                <a16:creationId xmlns:a16="http://schemas.microsoft.com/office/drawing/2014/main" id="{6BC8556A-5FB3-4B6D-A38E-6DBDA20692B9}"/>
+                <a16:creationId xmlns:a16="http://schemas.microsoft.com/office/drawing/2014/main" id="{545B8F2D-6F4F-46B3-A458-36176E1B213F}"/>
               </a:ext>
             </a:extLst>
           </p:cNvPr>
@@ -30147,19 +30372,14 @@
             <p:ph type="title"/>
           </p:nvPr>
         </p:nvSpPr>
-        <p:spPr>
-          <a:xfrm>
-            <a:off x="550164" y="365760"/>
-            <a:ext cx="11091672" cy="1231106"/>
-          </a:xfrm>
-        </p:spPr>
+        <p:spPr/>
         <p:txBody>
           <a:bodyPr/>
           <a:lstStyle/>
           <a:p>
             <a:r>
               <a:rPr lang="en-US" dirty="0"/>
-              <a:t>Ways to continue building your Python and R skills</a:t>
+              <a:t>Extra Resources for Learning Python</a:t>
             </a:r>
           </a:p>
         </p:txBody>
@@ -30169,7 +30389,7 @@
           <p:cNvPr id="3" name="Slide Number Placeholder 2">
             <a:extLst>
               <a:ext uri="{FF2B5EF4-FFF2-40B4-BE49-F238E27FC236}">
-                <a16:creationId xmlns:a16="http://schemas.microsoft.com/office/drawing/2014/main" id="{38214455-0F24-455F-9F79-D516658AC025}"/>
+                <a16:creationId xmlns:a16="http://schemas.microsoft.com/office/drawing/2014/main" id="{4D10F399-EE4A-4982-895E-605F52BDA6CC}"/>
               </a:ext>
             </a:extLst>
           </p:cNvPr>
@@ -30198,7 +30418,7 @@
           <p:cNvPr id="4" name="Content Placeholder 3">
             <a:extLst>
               <a:ext uri="{FF2B5EF4-FFF2-40B4-BE49-F238E27FC236}">
-                <a16:creationId xmlns:a16="http://schemas.microsoft.com/office/drawing/2014/main" id="{C7A25E5F-B827-4DC5-823D-94DE3C6EC99F}"/>
+                <a16:creationId xmlns:a16="http://schemas.microsoft.com/office/drawing/2014/main" id="{90C94545-585F-4B4D-82C3-0F5B579410E4}"/>
               </a:ext>
             </a:extLst>
           </p:cNvPr>
@@ -30211,23 +30431,44 @@
         </p:nvSpPr>
         <p:spPr>
           <a:xfrm>
-            <a:off x="6252755" y="1745215"/>
-            <a:ext cx="5449824" cy="4572000"/>
+            <a:off x="504678" y="2343150"/>
+            <a:ext cx="5449824" cy="2562958"/>
           </a:xfrm>
         </p:spPr>
         <p:txBody>
           <a:bodyPr/>
           <a:lstStyle/>
+          <a:p>
+            <a:r>
+              <a:rPr lang="en-US" dirty="0"/>
+              <a:t>If you are still learning Python or feeling shaky on the basics (even after doing the readings), consider doing the following:</a:t>
+            </a:r>
+          </a:p>
+          <a:p>
+            <a:r>
+              <a:rPr lang="en-US" dirty="0"/>
+              <a:t>Complete most of the </a:t>
+            </a:r>
+            <a:r>
+              <a:rPr lang="en-US" dirty="0">
+                <a:hlinkClick r:id="rId2"/>
+              </a:rPr>
+              <a:t>Udacity Intro to Python Course</a:t>
+            </a:r>
+            <a:r>
+              <a:rPr lang="en-US" dirty="0"/>
+              <a:t>.</a:t>
+            </a:r>
+          </a:p>
           <a:p>
             <a:pPr marL="285750" indent="-285750">
               <a:buFont typeface="Arial" panose="020B0604020202020204" pitchFamily="34" charset="0"/>
               <a:buChar char="•"/>
             </a:pPr>
             <a:r>
-              <a:rPr lang="en-US" dirty="0" err="1"/>
-              <a:t>DataCamp</a:t>
-            </a:r>
-            <a:endParaRPr lang="en-US" dirty="0"/>
+              <a:rPr lang="en-US" dirty="0"/>
+              <a:t>Weeks 1 and 2: Lessons 1 and 2</a:t>
+            </a:r>
           </a:p>
           <a:p>
             <a:pPr marL="285750" indent="-285750">
@@ -30235,10 +30476,9 @@
               <a:buChar char="•"/>
             </a:pPr>
             <a:r>
-              <a:rPr lang="en-US" dirty="0" err="1"/>
-              <a:t>DataQuest</a:t>
-            </a:r>
-            <a:endParaRPr lang="en-US" dirty="0"/>
+              <a:rPr lang="en-US" dirty="0"/>
+              <a:t>Week 3 and 4: Lesson 3</a:t>
+            </a:r>
           </a:p>
           <a:p>
             <a:pPr marL="285750" indent="-285750">
@@ -30246,10 +30486,9 @@
               <a:buChar char="•"/>
             </a:pPr>
             <a:r>
-              <a:rPr lang="en-US" dirty="0" err="1"/>
-              <a:t>Hackerrank</a:t>
-            </a:r>
-            <a:endParaRPr lang="en-US" dirty="0"/>
+              <a:rPr lang="en-US" dirty="0"/>
+              <a:t>Week 5 and 6: Lesson 4</a:t>
+            </a:r>
           </a:p>
           <a:p>
             <a:pPr marL="285750" indent="-285750">
@@ -30258,124 +30497,112 @@
             </a:pPr>
             <a:r>
               <a:rPr lang="en-US" dirty="0"/>
-              <a:t>Reading the official Python documentation or documentation for other Python packages</a:t>
-            </a:r>
-          </a:p>
-          <a:p>
-            <a:pPr marL="285750" indent="-285750">
-              <a:buFont typeface="Arial" panose="020B0604020202020204" pitchFamily="34" charset="0"/>
-              <a:buChar char="•"/>
-            </a:pPr>
-            <a:r>
-              <a:rPr lang="en-US" dirty="0"/>
-              <a:t>Kaggle (participating in competitions, looking at what others are doing)</a:t>
-            </a:r>
-          </a:p>
-          <a:p>
-            <a:pPr marL="285750" indent="-285750">
-              <a:buFont typeface="Arial" panose="020B0604020202020204" pitchFamily="34" charset="0"/>
-              <a:buChar char="•"/>
-            </a:pPr>
-            <a:r>
-              <a:rPr lang="en-US" dirty="0"/>
-              <a:t>Codewars.com</a:t>
-            </a:r>
-          </a:p>
-          <a:p>
-            <a:pPr marL="285750" indent="-285750">
-              <a:buFont typeface="Arial" panose="020B0604020202020204" pitchFamily="34" charset="0"/>
-              <a:buChar char="•"/>
-            </a:pPr>
-            <a:r>
-              <a:rPr lang="en-US" dirty="0"/>
-              <a:t>Books (e.g. Clean Code with Python 2</a:t>
-            </a:r>
-            <a:r>
-              <a:rPr lang="en-US" baseline="30000" dirty="0"/>
-              <a:t>nd</a:t>
-            </a:r>
-            <a:r>
-              <a:rPr lang="en-US" dirty="0"/>
-              <a:t> Edition by Mariano Anaya), Minimal Python by Noah Gift and Alfredo </a:t>
-            </a:r>
-            <a:r>
-              <a:rPr lang="en-US" dirty="0" err="1"/>
-              <a:t>Deza</a:t>
-            </a:r>
-            <a:r>
-              <a:rPr lang="en-US" dirty="0"/>
-              <a:t>, Python Data Science Essentials by Alberto </a:t>
-            </a:r>
-            <a:r>
-              <a:rPr lang="en-US" dirty="0" err="1"/>
-              <a:t>Boschetti</a:t>
-            </a:r>
-            <a:r>
-              <a:rPr lang="en-US" dirty="0"/>
-              <a:t>, </a:t>
-            </a:r>
-            <a:r>
-              <a:rPr lang="en-US" dirty="0" err="1"/>
-              <a:t>etc</a:t>
-            </a:r>
-            <a:r>
-              <a:rPr lang="en-US" dirty="0"/>
-              <a:t>)</a:t>
-            </a:r>
-          </a:p>
-        </p:txBody>
-      </p:sp>
-      <p:pic>
-        <p:nvPicPr>
-          <p:cNvPr id="6" name="Picture 2" descr="Python - Wikiversity">
+              <a:t>Week 7 and 8: Lesson 5</a:t>
+            </a:r>
+          </a:p>
+          <a:p>
+            <a:endParaRPr lang="en-US" dirty="0"/>
+          </a:p>
+        </p:txBody>
+      </p:sp>
+      <p:sp>
+        <p:nvSpPr>
+          <p:cNvPr id="5" name="Content Placeholder 4">
             <a:extLst>
               <a:ext uri="{FF2B5EF4-FFF2-40B4-BE49-F238E27FC236}">
-                <a16:creationId xmlns:a16="http://schemas.microsoft.com/office/drawing/2014/main" id="{3B8539A0-A6B4-4F2A-85CF-CDF1A2B7D67B}"/>
+                <a16:creationId xmlns:a16="http://schemas.microsoft.com/office/drawing/2014/main" id="{251434B5-D9AF-4C06-A62A-24B2E66F4170}"/>
               </a:ext>
             </a:extLst>
           </p:cNvPr>
-          <p:cNvPicPr>
-            <a:picLocks noChangeAspect="1" noChangeArrowheads="1"/>
-          </p:cNvPicPr>
-          <p:nvPr/>
-        </p:nvPicPr>
-        <p:blipFill>
-          <a:blip r:embed="rId2">
+          <p:cNvSpPr>
+            <a:spLocks noGrp="1"/>
+          </p:cNvSpPr>
+          <p:nvPr>
+            <p:ph sz="quarter" idx="15"/>
+          </p:nvPr>
+        </p:nvSpPr>
+        <p:spPr>
+          <a:xfrm>
+            <a:off x="6344359" y="2360734"/>
+            <a:ext cx="5449824" cy="2681653"/>
+          </a:xfrm>
+        </p:spPr>
+        <p:txBody>
+          <a:bodyPr/>
+          <a:lstStyle/>
+          <a:p>
+            <a:r>
+              <a:rPr lang="en-US" dirty="0"/>
+              <a:t>If you are feeling relatively comfortable with Python, you might consider doing the Kaggle course on Python if you need a refresher: </a:t>
+            </a:r>
+            <a:r>
+              <a:rPr lang="en-US" dirty="0">
+                <a:hlinkClick r:id="rId3"/>
+              </a:rPr>
+              <a:t>https://www.kaggle.com/learn/python</a:t>
+            </a:r>
+            <a:endParaRPr lang="en-US" dirty="0"/>
+          </a:p>
+          <a:p>
+            <a:endParaRPr lang="en-US" dirty="0"/>
+          </a:p>
+          <a:p>
+            <a:r>
+              <a:rPr lang="en-US" dirty="0"/>
+              <a:t>There are many other Python learning resources for all levels listed here: </a:t>
+            </a:r>
+            <a:r>
+              <a:rPr lang="en-US" dirty="0">
+                <a:hlinkClick r:id="rId4"/>
+              </a:rPr>
+              <a:t>https://forums.fast.ai/t/recommended-python-learning-resources/26888</a:t>
+            </a:r>
+            <a:endParaRPr lang="en-US" dirty="0"/>
+          </a:p>
+          <a:p>
+            <a:endParaRPr lang="en-US" dirty="0"/>
+          </a:p>
+        </p:txBody>
+      </p:sp>
+      <p:sp>
+        <p:nvSpPr>
+          <p:cNvPr id="8" name="TextBox 7">
             <a:extLst>
-              <a:ext uri="{28A0092B-C50C-407E-A947-70E740481C1C}">
-                <a14:useLocalDpi xmlns:a14="http://schemas.microsoft.com/office/drawing/2010/main" val="0"/>
+              <a:ext uri="{FF2B5EF4-FFF2-40B4-BE49-F238E27FC236}">
+                <a16:creationId xmlns:a16="http://schemas.microsoft.com/office/drawing/2014/main" id="{D76A893C-FF9D-455A-81F9-7C481B641A0A}"/>
               </a:ext>
             </a:extLst>
-          </a:blip>
-          <a:srcRect/>
-          <a:stretch>
-            <a:fillRect/>
-          </a:stretch>
-        </p:blipFill>
-        <p:spPr bwMode="auto">
-          <a:xfrm>
-            <a:off x="896258" y="1664305"/>
-            <a:ext cx="4443790" cy="4443790"/>
+          </p:cNvPr>
+          <p:cNvSpPr txBox="1"/>
+          <p:nvPr/>
+        </p:nvSpPr>
+        <p:spPr>
+          <a:xfrm>
+            <a:off x="2545290" y="1228579"/>
+            <a:ext cx="7176106" cy="646331"/>
           </a:xfrm>
           <a:prstGeom prst="rect">
             <a:avLst/>
           </a:prstGeom>
           <a:noFill/>
-          <a:extLst>
-            <a:ext uri="{909E8E84-426E-40DD-AFC4-6F175D3DCCD1}">
-              <a14:hiddenFill xmlns:a14="http://schemas.microsoft.com/office/drawing/2010/main">
-                <a:solidFill>
-                  <a:srgbClr val="FFFFFF"/>
-                </a:solidFill>
-              </a14:hiddenFill>
-            </a:ext>
-          </a:extLst>
-        </p:spPr>
-      </p:pic>
+        </p:spPr>
+        <p:txBody>
+          <a:bodyPr wrap="square" rtlCol="0">
+            <a:spAutoFit/>
+          </a:bodyPr>
+          <a:lstStyle/>
+          <a:p>
+            <a:r>
+              <a:rPr lang="en-US" dirty="0"/>
+              <a:t>Python is a foundational skill for much of modern data science. It is worth putting in some time to build solid Python skills.</a:t>
+            </a:r>
+          </a:p>
+        </p:txBody>
+      </p:sp>
     </p:spTree>
     <p:extLst>
       <p:ext uri="{BB962C8B-B14F-4D97-AF65-F5344CB8AC3E}">
-        <p14:creationId xmlns:p14="http://schemas.microsoft.com/office/powerpoint/2010/main" val="1807528862"/>
+        <p14:creationId xmlns:p14="http://schemas.microsoft.com/office/powerpoint/2010/main" val="3718481214"/>
       </p:ext>
     </p:extLst>
   </p:cSld>
@@ -31059,21 +31286,6 @@
 </file>
 
 <file path=customXml/item1.xml><?xml version="1.0" encoding="utf-8"?>
-<?mso-contentType ?>
-<FormTemplates xmlns="http://schemas.microsoft.com/sharepoint/v3/contenttype/forms">
-  <Display>DocumentLibraryForm</Display>
-  <Edit>DocumentLibraryForm</Edit>
-  <New>DocumentLibraryForm</New>
-</FormTemplates>
-</file>
-
-<file path=customXml/item2.xml><?xml version="1.0" encoding="utf-8"?>
-<p:properties xmlns:p="http://schemas.microsoft.com/office/2006/metadata/properties" xmlns:xsi="http://www.w3.org/2001/XMLSchema-instance" xmlns:pc="http://schemas.microsoft.com/office/infopath/2007/PartnerControls">
-  <documentManagement/>
-</p:properties>
-</file>
-
-<file path=customXml/item3.xml><?xml version="1.0" encoding="utf-8"?>
 <ct:contentTypeSchema xmlns:ct="http://schemas.microsoft.com/office/2006/metadata/contentType" xmlns:ma="http://schemas.microsoft.com/office/2006/metadata/properties/metaAttributes" ct:_="" ma:_="" ma:contentTypeName="Document" ma:contentTypeID="0x010100454E05F891A6C444B2C9B2ADC48AF1E6" ma:contentTypeVersion="12" ma:contentTypeDescription="Create a new document." ma:contentTypeScope="" ma:versionID="358421fc23607e7bbb7e455df6c12720">
   <xsd:schema xmlns:xsd="http://www.w3.org/2001/XMLSchema" xmlns:xs="http://www.w3.org/2001/XMLSchema" xmlns:p="http://schemas.microsoft.com/office/2006/metadata/properties" xmlns:ns2="2548bf9a-46dd-448f-87d6-21281256ebbe" xmlns:ns3="9ae61e79-8f21-4eed-99cc-3b34db05f7f0" targetNamespace="http://schemas.microsoft.com/office/2006/metadata/properties" ma:root="true" ma:fieldsID="b451f36b5d9ab658937611de969d6da1" ns2:_="" ns3:_="">
     <xsd:import namespace="2548bf9a-46dd-448f-87d6-21281256ebbe"/>
@@ -31290,10 +31502,36 @@
 </ct:contentTypeSchema>
 </file>
 
+<file path=customXml/item2.xml><?xml version="1.0" encoding="utf-8"?>
+<p:properties xmlns:p="http://schemas.microsoft.com/office/2006/metadata/properties" xmlns:xsi="http://www.w3.org/2001/XMLSchema-instance" xmlns:pc="http://schemas.microsoft.com/office/infopath/2007/PartnerControls">
+  <documentManagement/>
+</p:properties>
+</file>
+
+<file path=customXml/item3.xml><?xml version="1.0" encoding="utf-8"?>
+<?mso-contentType ?>
+<FormTemplates xmlns="http://schemas.microsoft.com/sharepoint/v3/contenttype/forms">
+  <Display>DocumentLibraryForm</Display>
+  <Edit>DocumentLibraryForm</Edit>
+  <New>DocumentLibraryForm</New>
+</FormTemplates>
+</file>
+
 <file path=customXml/itemProps1.xml><?xml version="1.0" encoding="utf-8"?>
-<ds:datastoreItem xmlns:ds="http://schemas.openxmlformats.org/officeDocument/2006/customXml" ds:itemID="{6E121EAF-0B9A-4814-913F-ED5ADC50F518}">
+<ds:datastoreItem xmlns:ds="http://schemas.openxmlformats.org/officeDocument/2006/customXml" ds:itemID="{24E8EF9C-5FFC-4625-929F-FAAA4BA549AA}">
   <ds:schemaRefs>
-    <ds:schemaRef ds:uri="http://schemas.microsoft.com/sharepoint/v3/contenttype/forms"/>
+    <ds:schemaRef ds:uri="http://schemas.microsoft.com/office/2006/metadata/contentType"/>
+    <ds:schemaRef ds:uri="http://schemas.microsoft.com/office/2006/metadata/properties/metaAttributes"/>
+    <ds:schemaRef ds:uri="http://www.w3.org/2001/XMLSchema"/>
+    <ds:schemaRef ds:uri="http://schemas.microsoft.com/office/2006/metadata/properties"/>
+    <ds:schemaRef ds:uri="2548bf9a-46dd-448f-87d6-21281256ebbe"/>
+    <ds:schemaRef ds:uri="9ae61e79-8f21-4eed-99cc-3b34db05f7f0"/>
+    <ds:schemaRef ds:uri="http://schemas.microsoft.com/office/2006/documentManagement/types"/>
+    <ds:schemaRef ds:uri="http://schemas.microsoft.com/office/infopath/2007/PartnerControls"/>
+    <ds:schemaRef ds:uri="http://schemas.openxmlformats.org/package/2006/metadata/core-properties"/>
+    <ds:schemaRef ds:uri="http://purl.org/dc/elements/1.1/"/>
+    <ds:schemaRef ds:uri="http://purl.org/dc/terms/"/>
+    <ds:schemaRef ds:uri="http://schemas.microsoft.com/internal/obd"/>
   </ds:schemaRefs>
 </ds:datastoreItem>
 </file>
@@ -31316,20 +31554,9 @@
 </file>
 
 <file path=customXml/itemProps3.xml><?xml version="1.0" encoding="utf-8"?>
-<ds:datastoreItem xmlns:ds="http://schemas.openxmlformats.org/officeDocument/2006/customXml" ds:itemID="{24E8EF9C-5FFC-4625-929F-FAAA4BA549AA}">
+<ds:datastoreItem xmlns:ds="http://schemas.openxmlformats.org/officeDocument/2006/customXml" ds:itemID="{6E121EAF-0B9A-4814-913F-ED5ADC50F518}">
   <ds:schemaRefs>
-    <ds:schemaRef ds:uri="http://schemas.microsoft.com/office/2006/metadata/contentType"/>
-    <ds:schemaRef ds:uri="http://schemas.microsoft.com/office/2006/metadata/properties/metaAttributes"/>
-    <ds:schemaRef ds:uri="http://www.w3.org/2001/XMLSchema"/>
-    <ds:schemaRef ds:uri="http://schemas.microsoft.com/office/2006/metadata/properties"/>
-    <ds:schemaRef ds:uri="2548bf9a-46dd-448f-87d6-21281256ebbe"/>
-    <ds:schemaRef ds:uri="9ae61e79-8f21-4eed-99cc-3b34db05f7f0"/>
-    <ds:schemaRef ds:uri="http://schemas.microsoft.com/office/2006/documentManagement/types"/>
-    <ds:schemaRef ds:uri="http://schemas.microsoft.com/office/infopath/2007/PartnerControls"/>
-    <ds:schemaRef ds:uri="http://schemas.openxmlformats.org/package/2006/metadata/core-properties"/>
-    <ds:schemaRef ds:uri="http://purl.org/dc/elements/1.1/"/>
-    <ds:schemaRef ds:uri="http://purl.org/dc/terms/"/>
-    <ds:schemaRef ds:uri="http://schemas.microsoft.com/internal/obd"/>
+    <ds:schemaRef ds:uri="http://schemas.microsoft.com/sharepoint/v3/contenttype/forms"/>
   </ds:schemaRefs>
 </ds:datastoreItem>
 </file>
</xml_diff>